<commit_message>
Actualización del nivel I
</commit_message>
<xml_diff>
--- a/Proyecto 1/Diseño/Bosquejo de bloques.pptx
+++ b/Proyecto 1/Diseño/Bosquejo de bloques.pptx
@@ -5,7 +5,8 @@
     <p:sldMasterId id="2147483648" r:id="rId1"/>
   </p:sldMasterIdLst>
   <p:sldIdLst>
-    <p:sldId id="256" r:id="rId2"/>
+    <p:sldId id="257" r:id="rId2"/>
+    <p:sldId id="256" r:id="rId3"/>
   </p:sldIdLst>
   <p:sldSz cx="12192000" cy="6858000"/>
   <p:notesSz cx="6858000" cy="9144000"/>
@@ -104,6 +105,11 @@
       </a:defRPr>
     </a:lvl9pPr>
   </p:defaultTextStyle>
+  <p:extLst>
+    <p:ext uri="{EFAFB233-063F-42B5-8137-9DF3F51BA10A}">
+      <p15:sldGuideLst xmlns:p15="http://schemas.microsoft.com/office/powerpoint/2012/main"/>
+    </p:ext>
+  </p:extLst>
 </p:presentation>
 </file>
 
@@ -2966,6 +2972,1106 @@
       </p:grpSpPr>
       <p:sp>
         <p:nvSpPr>
+          <p:cNvPr id="5" name="Rectángulo 4"/>
+          <p:cNvSpPr/>
+          <p:nvPr/>
+        </p:nvSpPr>
+        <p:spPr>
+          <a:xfrm>
+            <a:off x="4613944" y="2625755"/>
+            <a:ext cx="226502" cy="226502"/>
+          </a:xfrm>
+          <a:prstGeom prst="rect">
+            <a:avLst/>
+          </a:prstGeom>
+        </p:spPr>
+        <p:style>
+          <a:lnRef idx="2">
+            <a:schemeClr val="accent1">
+              <a:shade val="50000"/>
+            </a:schemeClr>
+          </a:lnRef>
+          <a:fillRef idx="1">
+            <a:schemeClr val="accent1"/>
+          </a:fillRef>
+          <a:effectRef idx="0">
+            <a:schemeClr val="accent1"/>
+          </a:effectRef>
+          <a:fontRef idx="minor">
+            <a:schemeClr val="lt1"/>
+          </a:fontRef>
+        </p:style>
+        <p:txBody>
+          <a:bodyPr rtlCol="0" anchor="ctr"/>
+          <a:lstStyle/>
+          <a:p>
+            <a:pPr algn="ctr"/>
+            <a:endParaRPr lang="es-419"/>
+          </a:p>
+        </p:txBody>
+      </p:sp>
+      <p:sp>
+        <p:nvSpPr>
+          <p:cNvPr id="11" name="Rectángulo 10"/>
+          <p:cNvSpPr/>
+          <p:nvPr/>
+        </p:nvSpPr>
+        <p:spPr>
+          <a:xfrm>
+            <a:off x="4613944" y="2957119"/>
+            <a:ext cx="226502" cy="226502"/>
+          </a:xfrm>
+          <a:prstGeom prst="rect">
+            <a:avLst/>
+          </a:prstGeom>
+        </p:spPr>
+        <p:style>
+          <a:lnRef idx="2">
+            <a:schemeClr val="accent1">
+              <a:shade val="50000"/>
+            </a:schemeClr>
+          </a:lnRef>
+          <a:fillRef idx="1">
+            <a:schemeClr val="accent1"/>
+          </a:fillRef>
+          <a:effectRef idx="0">
+            <a:schemeClr val="accent1"/>
+          </a:effectRef>
+          <a:fontRef idx="minor">
+            <a:schemeClr val="lt1"/>
+          </a:fontRef>
+        </p:style>
+        <p:txBody>
+          <a:bodyPr rtlCol="0" anchor="ctr"/>
+          <a:lstStyle/>
+          <a:p>
+            <a:pPr algn="ctr"/>
+            <a:endParaRPr lang="es-419"/>
+          </a:p>
+        </p:txBody>
+      </p:sp>
+      <p:sp>
+        <p:nvSpPr>
+          <p:cNvPr id="14" name="Rectángulo 13"/>
+          <p:cNvSpPr/>
+          <p:nvPr/>
+        </p:nvSpPr>
+        <p:spPr>
+          <a:xfrm>
+            <a:off x="4613944" y="4458748"/>
+            <a:ext cx="226502" cy="226502"/>
+          </a:xfrm>
+          <a:prstGeom prst="rect">
+            <a:avLst/>
+          </a:prstGeom>
+        </p:spPr>
+        <p:style>
+          <a:lnRef idx="2">
+            <a:schemeClr val="accent1">
+              <a:shade val="50000"/>
+            </a:schemeClr>
+          </a:lnRef>
+          <a:fillRef idx="1">
+            <a:schemeClr val="accent1"/>
+          </a:fillRef>
+          <a:effectRef idx="0">
+            <a:schemeClr val="accent1"/>
+          </a:effectRef>
+          <a:fontRef idx="minor">
+            <a:schemeClr val="lt1"/>
+          </a:fontRef>
+        </p:style>
+        <p:txBody>
+          <a:bodyPr rtlCol="0" anchor="ctr"/>
+          <a:lstStyle/>
+          <a:p>
+            <a:pPr algn="ctr"/>
+            <a:endParaRPr lang="es-419"/>
+          </a:p>
+        </p:txBody>
+      </p:sp>
+      <p:sp>
+        <p:nvSpPr>
+          <p:cNvPr id="16" name="Rectángulo 15"/>
+          <p:cNvSpPr/>
+          <p:nvPr/>
+        </p:nvSpPr>
+        <p:spPr>
+          <a:xfrm>
+            <a:off x="4613944" y="4748168"/>
+            <a:ext cx="226502" cy="226502"/>
+          </a:xfrm>
+          <a:prstGeom prst="rect">
+            <a:avLst/>
+          </a:prstGeom>
+        </p:spPr>
+        <p:style>
+          <a:lnRef idx="2">
+            <a:schemeClr val="accent1">
+              <a:shade val="50000"/>
+            </a:schemeClr>
+          </a:lnRef>
+          <a:fillRef idx="1">
+            <a:schemeClr val="accent1"/>
+          </a:fillRef>
+          <a:effectRef idx="0">
+            <a:schemeClr val="accent1"/>
+          </a:effectRef>
+          <a:fontRef idx="minor">
+            <a:schemeClr val="lt1"/>
+          </a:fontRef>
+        </p:style>
+        <p:txBody>
+          <a:bodyPr rtlCol="0" anchor="ctr"/>
+          <a:lstStyle/>
+          <a:p>
+            <a:pPr algn="ctr"/>
+            <a:endParaRPr lang="es-419"/>
+          </a:p>
+        </p:txBody>
+      </p:sp>
+      <p:sp>
+        <p:nvSpPr>
+          <p:cNvPr id="18" name="Rectángulo 17"/>
+          <p:cNvSpPr/>
+          <p:nvPr/>
+        </p:nvSpPr>
+        <p:spPr>
+          <a:xfrm>
+            <a:off x="4613944" y="5037588"/>
+            <a:ext cx="226502" cy="226502"/>
+          </a:xfrm>
+          <a:prstGeom prst="rect">
+            <a:avLst/>
+          </a:prstGeom>
+        </p:spPr>
+        <p:style>
+          <a:lnRef idx="2">
+            <a:schemeClr val="accent1">
+              <a:shade val="50000"/>
+            </a:schemeClr>
+          </a:lnRef>
+          <a:fillRef idx="1">
+            <a:schemeClr val="accent1"/>
+          </a:fillRef>
+          <a:effectRef idx="0">
+            <a:schemeClr val="accent1"/>
+          </a:effectRef>
+          <a:fontRef idx="minor">
+            <a:schemeClr val="lt1"/>
+          </a:fontRef>
+        </p:style>
+        <p:txBody>
+          <a:bodyPr rtlCol="0" anchor="ctr"/>
+          <a:lstStyle/>
+          <a:p>
+            <a:pPr algn="ctr"/>
+            <a:endParaRPr lang="es-419"/>
+          </a:p>
+        </p:txBody>
+      </p:sp>
+      <p:sp>
+        <p:nvSpPr>
+          <p:cNvPr id="25" name="Rectángulo 24"/>
+          <p:cNvSpPr/>
+          <p:nvPr/>
+        </p:nvSpPr>
+        <p:spPr>
+          <a:xfrm>
+            <a:off x="6870584" y="3173135"/>
+            <a:ext cx="226502" cy="226502"/>
+          </a:xfrm>
+          <a:prstGeom prst="rect">
+            <a:avLst/>
+          </a:prstGeom>
+        </p:spPr>
+        <p:style>
+          <a:lnRef idx="2">
+            <a:schemeClr val="accent1">
+              <a:shade val="50000"/>
+            </a:schemeClr>
+          </a:lnRef>
+          <a:fillRef idx="1">
+            <a:schemeClr val="accent1"/>
+          </a:fillRef>
+          <a:effectRef idx="0">
+            <a:schemeClr val="accent1"/>
+          </a:effectRef>
+          <a:fontRef idx="minor">
+            <a:schemeClr val="lt1"/>
+          </a:fontRef>
+        </p:style>
+        <p:txBody>
+          <a:bodyPr rtlCol="0" anchor="ctr"/>
+          <a:lstStyle/>
+          <a:p>
+            <a:pPr algn="ctr"/>
+            <a:endParaRPr lang="es-419"/>
+          </a:p>
+        </p:txBody>
+      </p:sp>
+      <p:sp>
+        <p:nvSpPr>
+          <p:cNvPr id="31" name="Rectángulo 30"/>
+          <p:cNvSpPr/>
+          <p:nvPr/>
+        </p:nvSpPr>
+        <p:spPr>
+          <a:xfrm>
+            <a:off x="6870584" y="3508585"/>
+            <a:ext cx="226502" cy="226502"/>
+          </a:xfrm>
+          <a:prstGeom prst="rect">
+            <a:avLst/>
+          </a:prstGeom>
+        </p:spPr>
+        <p:style>
+          <a:lnRef idx="2">
+            <a:schemeClr val="accent1">
+              <a:shade val="50000"/>
+            </a:schemeClr>
+          </a:lnRef>
+          <a:fillRef idx="1">
+            <a:schemeClr val="accent1"/>
+          </a:fillRef>
+          <a:effectRef idx="0">
+            <a:schemeClr val="accent1"/>
+          </a:effectRef>
+          <a:fontRef idx="minor">
+            <a:schemeClr val="lt1"/>
+          </a:fontRef>
+        </p:style>
+        <p:txBody>
+          <a:bodyPr rtlCol="0" anchor="ctr"/>
+          <a:lstStyle/>
+          <a:p>
+            <a:pPr algn="ctr"/>
+            <a:endParaRPr lang="es-419"/>
+          </a:p>
+        </p:txBody>
+      </p:sp>
+      <p:sp>
+        <p:nvSpPr>
+          <p:cNvPr id="33" name="Rectángulo 32"/>
+          <p:cNvSpPr/>
+          <p:nvPr/>
+        </p:nvSpPr>
+        <p:spPr>
+          <a:xfrm>
+            <a:off x="6870584" y="3835430"/>
+            <a:ext cx="226502" cy="226502"/>
+          </a:xfrm>
+          <a:prstGeom prst="rect">
+            <a:avLst/>
+          </a:prstGeom>
+        </p:spPr>
+        <p:style>
+          <a:lnRef idx="2">
+            <a:schemeClr val="accent1">
+              <a:shade val="50000"/>
+            </a:schemeClr>
+          </a:lnRef>
+          <a:fillRef idx="1">
+            <a:schemeClr val="accent1"/>
+          </a:fillRef>
+          <a:effectRef idx="0">
+            <a:schemeClr val="accent1"/>
+          </a:effectRef>
+          <a:fontRef idx="minor">
+            <a:schemeClr val="lt1"/>
+          </a:fontRef>
+        </p:style>
+        <p:txBody>
+          <a:bodyPr rtlCol="0" anchor="ctr"/>
+          <a:lstStyle/>
+          <a:p>
+            <a:pPr algn="ctr"/>
+            <a:endParaRPr lang="es-419"/>
+          </a:p>
+        </p:txBody>
+      </p:sp>
+      <p:sp>
+        <p:nvSpPr>
+          <p:cNvPr id="35" name="Rectángulo 34"/>
+          <p:cNvSpPr/>
+          <p:nvPr/>
+        </p:nvSpPr>
+        <p:spPr>
+          <a:xfrm>
+            <a:off x="6870584" y="4162275"/>
+            <a:ext cx="226502" cy="226502"/>
+          </a:xfrm>
+          <a:prstGeom prst="rect">
+            <a:avLst/>
+          </a:prstGeom>
+        </p:spPr>
+        <p:style>
+          <a:lnRef idx="2">
+            <a:schemeClr val="accent1">
+              <a:shade val="50000"/>
+            </a:schemeClr>
+          </a:lnRef>
+          <a:fillRef idx="1">
+            <a:schemeClr val="accent1"/>
+          </a:fillRef>
+          <a:effectRef idx="0">
+            <a:schemeClr val="accent1"/>
+          </a:effectRef>
+          <a:fontRef idx="minor">
+            <a:schemeClr val="lt1"/>
+          </a:fontRef>
+        </p:style>
+        <p:txBody>
+          <a:bodyPr rtlCol="0" anchor="ctr"/>
+          <a:lstStyle/>
+          <a:p>
+            <a:pPr algn="ctr"/>
+            <a:endParaRPr lang="es-419"/>
+          </a:p>
+        </p:txBody>
+      </p:sp>
+      <p:sp>
+        <p:nvSpPr>
+          <p:cNvPr id="37" name="Rectángulo 36"/>
+          <p:cNvSpPr/>
+          <p:nvPr/>
+        </p:nvSpPr>
+        <p:spPr>
+          <a:xfrm>
+            <a:off x="6870584" y="4498773"/>
+            <a:ext cx="226502" cy="226502"/>
+          </a:xfrm>
+          <a:prstGeom prst="rect">
+            <a:avLst/>
+          </a:prstGeom>
+        </p:spPr>
+        <p:style>
+          <a:lnRef idx="2">
+            <a:schemeClr val="accent1">
+              <a:shade val="50000"/>
+            </a:schemeClr>
+          </a:lnRef>
+          <a:fillRef idx="1">
+            <a:schemeClr val="accent1"/>
+          </a:fillRef>
+          <a:effectRef idx="0">
+            <a:schemeClr val="accent1"/>
+          </a:effectRef>
+          <a:fontRef idx="minor">
+            <a:schemeClr val="lt1"/>
+          </a:fontRef>
+        </p:style>
+        <p:txBody>
+          <a:bodyPr rtlCol="0" anchor="ctr"/>
+          <a:lstStyle/>
+          <a:p>
+            <a:pPr algn="ctr"/>
+            <a:endParaRPr lang="es-419"/>
+          </a:p>
+        </p:txBody>
+      </p:sp>
+      <p:sp>
+        <p:nvSpPr>
+          <p:cNvPr id="2" name="Título 1"/>
+          <p:cNvSpPr>
+            <a:spLocks noGrp="1"/>
+          </p:cNvSpPr>
+          <p:nvPr>
+            <p:ph type="title"/>
+          </p:nvPr>
+        </p:nvSpPr>
+        <p:spPr/>
+        <p:txBody>
+          <a:bodyPr/>
+          <a:lstStyle/>
+          <a:p>
+            <a:r>
+              <a:rPr lang="es-419" dirty="0"/>
+              <a:t>Diseño Top-Down: I Nivel</a:t>
+            </a:r>
+          </a:p>
+        </p:txBody>
+      </p:sp>
+      <p:sp>
+        <p:nvSpPr>
+          <p:cNvPr id="4" name="Rectángulo 3"/>
+          <p:cNvSpPr/>
+          <p:nvPr/>
+        </p:nvSpPr>
+        <p:spPr>
+          <a:xfrm>
+            <a:off x="4613944" y="2483141"/>
+            <a:ext cx="2483142" cy="2885813"/>
+          </a:xfrm>
+          <a:prstGeom prst="rect">
+            <a:avLst/>
+          </a:prstGeom>
+        </p:spPr>
+        <p:style>
+          <a:lnRef idx="2">
+            <a:schemeClr val="dk1"/>
+          </a:lnRef>
+          <a:fillRef idx="1">
+            <a:schemeClr val="lt1"/>
+          </a:fillRef>
+          <a:effectRef idx="0">
+            <a:schemeClr val="dk1"/>
+          </a:effectRef>
+          <a:fontRef idx="minor">
+            <a:schemeClr val="dk1"/>
+          </a:fontRef>
+        </p:style>
+        <p:txBody>
+          <a:bodyPr rtlCol="0" anchor="ctr"/>
+          <a:lstStyle/>
+          <a:p>
+            <a:pPr algn="ctr"/>
+            <a:r>
+              <a:rPr lang="es-419" dirty="0"/>
+              <a:t>Circuito de impresión de iniciales por protocolo VGA</a:t>
+            </a:r>
+          </a:p>
+        </p:txBody>
+      </p:sp>
+      <p:cxnSp>
+        <p:nvCxnSpPr>
+          <p:cNvPr id="9" name="Conector recto de flecha 8"/>
+          <p:cNvCxnSpPr/>
+          <p:nvPr/>
+        </p:nvCxnSpPr>
+        <p:spPr>
+          <a:xfrm>
+            <a:off x="3640821" y="2730617"/>
+            <a:ext cx="973123" cy="0"/>
+          </a:xfrm>
+          <a:prstGeom prst="straightConnector1">
+            <a:avLst/>
+          </a:prstGeom>
+          <a:ln>
+            <a:tailEnd type="triangle"/>
+          </a:ln>
+        </p:spPr>
+        <p:style>
+          <a:lnRef idx="1">
+            <a:schemeClr val="dk1"/>
+          </a:lnRef>
+          <a:fillRef idx="0">
+            <a:schemeClr val="dk1"/>
+          </a:fillRef>
+          <a:effectRef idx="0">
+            <a:schemeClr val="dk1"/>
+          </a:effectRef>
+          <a:fontRef idx="minor">
+            <a:schemeClr val="tx1"/>
+          </a:fontRef>
+        </p:style>
+      </p:cxnSp>
+      <p:sp>
+        <p:nvSpPr>
+          <p:cNvPr id="10" name="CuadroTexto 9"/>
+          <p:cNvSpPr txBox="1"/>
+          <p:nvPr/>
+        </p:nvSpPr>
+        <p:spPr>
+          <a:xfrm>
+            <a:off x="2956018" y="2545951"/>
+            <a:ext cx="684803" cy="369332"/>
+          </a:xfrm>
+          <a:prstGeom prst="rect">
+            <a:avLst/>
+          </a:prstGeom>
+          <a:noFill/>
+        </p:spPr>
+        <p:txBody>
+          <a:bodyPr wrap="none" rtlCol="0">
+            <a:spAutoFit/>
+          </a:bodyPr>
+          <a:lstStyle/>
+          <a:p>
+            <a:r>
+              <a:rPr lang="es-419" dirty="0" err="1"/>
+              <a:t>Clock</a:t>
+            </a:r>
+            <a:endParaRPr lang="es-419" dirty="0"/>
+          </a:p>
+        </p:txBody>
+      </p:sp>
+      <p:cxnSp>
+        <p:nvCxnSpPr>
+          <p:cNvPr id="12" name="Conector recto de flecha 11"/>
+          <p:cNvCxnSpPr/>
+          <p:nvPr/>
+        </p:nvCxnSpPr>
+        <p:spPr>
+          <a:xfrm>
+            <a:off x="3640821" y="3061981"/>
+            <a:ext cx="973123" cy="0"/>
+          </a:xfrm>
+          <a:prstGeom prst="straightConnector1">
+            <a:avLst/>
+          </a:prstGeom>
+          <a:ln>
+            <a:tailEnd type="triangle"/>
+          </a:ln>
+        </p:spPr>
+        <p:style>
+          <a:lnRef idx="1">
+            <a:schemeClr val="dk1"/>
+          </a:lnRef>
+          <a:fillRef idx="0">
+            <a:schemeClr val="dk1"/>
+          </a:fillRef>
+          <a:effectRef idx="0">
+            <a:schemeClr val="dk1"/>
+          </a:effectRef>
+          <a:fontRef idx="minor">
+            <a:schemeClr val="tx1"/>
+          </a:fontRef>
+        </p:style>
+      </p:cxnSp>
+      <p:sp>
+        <p:nvSpPr>
+          <p:cNvPr id="13" name="CuadroTexto 12"/>
+          <p:cNvSpPr txBox="1"/>
+          <p:nvPr/>
+        </p:nvSpPr>
+        <p:spPr>
+          <a:xfrm>
+            <a:off x="2956018" y="2877315"/>
+            <a:ext cx="701987" cy="369332"/>
+          </a:xfrm>
+          <a:prstGeom prst="rect">
+            <a:avLst/>
+          </a:prstGeom>
+          <a:noFill/>
+        </p:spPr>
+        <p:txBody>
+          <a:bodyPr wrap="none" rtlCol="0">
+            <a:spAutoFit/>
+          </a:bodyPr>
+          <a:lstStyle/>
+          <a:p>
+            <a:r>
+              <a:rPr lang="es-419" dirty="0" err="1"/>
+              <a:t>Reset</a:t>
+            </a:r>
+            <a:endParaRPr lang="es-419" dirty="0"/>
+          </a:p>
+        </p:txBody>
+      </p:sp>
+      <p:cxnSp>
+        <p:nvCxnSpPr>
+          <p:cNvPr id="15" name="Conector recto de flecha 14"/>
+          <p:cNvCxnSpPr/>
+          <p:nvPr/>
+        </p:nvCxnSpPr>
+        <p:spPr>
+          <a:xfrm>
+            <a:off x="3640821" y="4563610"/>
+            <a:ext cx="973123" cy="0"/>
+          </a:xfrm>
+          <a:prstGeom prst="straightConnector1">
+            <a:avLst/>
+          </a:prstGeom>
+          <a:ln>
+            <a:tailEnd type="triangle"/>
+          </a:ln>
+        </p:spPr>
+        <p:style>
+          <a:lnRef idx="1">
+            <a:schemeClr val="dk1"/>
+          </a:lnRef>
+          <a:fillRef idx="0">
+            <a:schemeClr val="dk1"/>
+          </a:fillRef>
+          <a:effectRef idx="0">
+            <a:schemeClr val="dk1"/>
+          </a:effectRef>
+          <a:fontRef idx="minor">
+            <a:schemeClr val="tx1"/>
+          </a:fontRef>
+        </p:style>
+      </p:cxnSp>
+      <p:cxnSp>
+        <p:nvCxnSpPr>
+          <p:cNvPr id="17" name="Conector recto de flecha 16"/>
+          <p:cNvCxnSpPr/>
+          <p:nvPr/>
+        </p:nvCxnSpPr>
+        <p:spPr>
+          <a:xfrm>
+            <a:off x="3640821" y="4853030"/>
+            <a:ext cx="973123" cy="0"/>
+          </a:xfrm>
+          <a:prstGeom prst="straightConnector1">
+            <a:avLst/>
+          </a:prstGeom>
+          <a:ln>
+            <a:tailEnd type="triangle"/>
+          </a:ln>
+        </p:spPr>
+        <p:style>
+          <a:lnRef idx="1">
+            <a:schemeClr val="dk1"/>
+          </a:lnRef>
+          <a:fillRef idx="0">
+            <a:schemeClr val="dk1"/>
+          </a:fillRef>
+          <a:effectRef idx="0">
+            <a:schemeClr val="dk1"/>
+          </a:effectRef>
+          <a:fontRef idx="minor">
+            <a:schemeClr val="tx1"/>
+          </a:fontRef>
+        </p:style>
+      </p:cxnSp>
+      <p:cxnSp>
+        <p:nvCxnSpPr>
+          <p:cNvPr id="19" name="Conector recto de flecha 18"/>
+          <p:cNvCxnSpPr/>
+          <p:nvPr/>
+        </p:nvCxnSpPr>
+        <p:spPr>
+          <a:xfrm>
+            <a:off x="3640821" y="5142450"/>
+            <a:ext cx="973123" cy="0"/>
+          </a:xfrm>
+          <a:prstGeom prst="straightConnector1">
+            <a:avLst/>
+          </a:prstGeom>
+          <a:ln>
+            <a:tailEnd type="triangle"/>
+          </a:ln>
+        </p:spPr>
+        <p:style>
+          <a:lnRef idx="1">
+            <a:schemeClr val="dk1"/>
+          </a:lnRef>
+          <a:fillRef idx="0">
+            <a:schemeClr val="dk1"/>
+          </a:fillRef>
+          <a:effectRef idx="0">
+            <a:schemeClr val="dk1"/>
+          </a:effectRef>
+          <a:fontRef idx="minor">
+            <a:schemeClr val="tx1"/>
+          </a:fontRef>
+        </p:style>
+      </p:cxnSp>
+      <p:sp>
+        <p:nvSpPr>
+          <p:cNvPr id="20" name="CuadroTexto 19"/>
+          <p:cNvSpPr txBox="1"/>
+          <p:nvPr/>
+        </p:nvSpPr>
+        <p:spPr>
+          <a:xfrm>
+            <a:off x="3273899" y="4391365"/>
+            <a:ext cx="407484" cy="923330"/>
+          </a:xfrm>
+          <a:prstGeom prst="rect">
+            <a:avLst/>
+          </a:prstGeom>
+          <a:noFill/>
+        </p:spPr>
+        <p:txBody>
+          <a:bodyPr wrap="none" rtlCol="0">
+            <a:spAutoFit/>
+          </a:bodyPr>
+          <a:lstStyle/>
+          <a:p>
+            <a:r>
+              <a:rPr lang="es-419" dirty="0"/>
+              <a:t>S1</a:t>
+            </a:r>
+          </a:p>
+          <a:p>
+            <a:r>
+              <a:rPr lang="es-419" dirty="0"/>
+              <a:t>S2</a:t>
+            </a:r>
+          </a:p>
+          <a:p>
+            <a:r>
+              <a:rPr lang="es-419" dirty="0"/>
+              <a:t>S3</a:t>
+            </a:r>
+          </a:p>
+        </p:txBody>
+      </p:sp>
+      <p:sp>
+        <p:nvSpPr>
+          <p:cNvPr id="21" name="CuadroTexto 20"/>
+          <p:cNvSpPr txBox="1"/>
+          <p:nvPr/>
+        </p:nvSpPr>
+        <p:spPr>
+          <a:xfrm>
+            <a:off x="2494423" y="4074492"/>
+            <a:ext cx="1966436" cy="369332"/>
+          </a:xfrm>
+          <a:prstGeom prst="rect">
+            <a:avLst/>
+          </a:prstGeom>
+          <a:noFill/>
+        </p:spPr>
+        <p:txBody>
+          <a:bodyPr wrap="none" rtlCol="0">
+            <a:spAutoFit/>
+          </a:bodyPr>
+          <a:lstStyle/>
+          <a:p>
+            <a:r>
+              <a:rPr lang="es-419" dirty="0"/>
+              <a:t>Selectores de color</a:t>
+            </a:r>
+          </a:p>
+        </p:txBody>
+      </p:sp>
+      <p:cxnSp>
+        <p:nvCxnSpPr>
+          <p:cNvPr id="30" name="Conector recto de flecha 29"/>
+          <p:cNvCxnSpPr/>
+          <p:nvPr/>
+        </p:nvCxnSpPr>
+        <p:spPr>
+          <a:xfrm>
+            <a:off x="7097086" y="3282083"/>
+            <a:ext cx="1057013" cy="0"/>
+          </a:xfrm>
+          <a:prstGeom prst="straightConnector1">
+            <a:avLst/>
+          </a:prstGeom>
+          <a:ln>
+            <a:tailEnd type="triangle"/>
+          </a:ln>
+        </p:spPr>
+        <p:style>
+          <a:lnRef idx="1">
+            <a:schemeClr val="dk1"/>
+          </a:lnRef>
+          <a:fillRef idx="0">
+            <a:schemeClr val="dk1"/>
+          </a:fillRef>
+          <a:effectRef idx="0">
+            <a:schemeClr val="dk1"/>
+          </a:effectRef>
+          <a:fontRef idx="minor">
+            <a:schemeClr val="tx1"/>
+          </a:fontRef>
+        </p:style>
+      </p:cxnSp>
+      <p:cxnSp>
+        <p:nvCxnSpPr>
+          <p:cNvPr id="32" name="Conector recto de flecha 31"/>
+          <p:cNvCxnSpPr/>
+          <p:nvPr/>
+        </p:nvCxnSpPr>
+        <p:spPr>
+          <a:xfrm>
+            <a:off x="7097086" y="3617533"/>
+            <a:ext cx="1057013" cy="0"/>
+          </a:xfrm>
+          <a:prstGeom prst="straightConnector1">
+            <a:avLst/>
+          </a:prstGeom>
+          <a:ln>
+            <a:tailEnd type="triangle"/>
+          </a:ln>
+        </p:spPr>
+        <p:style>
+          <a:lnRef idx="1">
+            <a:schemeClr val="dk1"/>
+          </a:lnRef>
+          <a:fillRef idx="0">
+            <a:schemeClr val="dk1"/>
+          </a:fillRef>
+          <a:effectRef idx="0">
+            <a:schemeClr val="dk1"/>
+          </a:effectRef>
+          <a:fontRef idx="minor">
+            <a:schemeClr val="tx1"/>
+          </a:fontRef>
+        </p:style>
+      </p:cxnSp>
+      <p:cxnSp>
+        <p:nvCxnSpPr>
+          <p:cNvPr id="34" name="Conector recto de flecha 33"/>
+          <p:cNvCxnSpPr/>
+          <p:nvPr/>
+        </p:nvCxnSpPr>
+        <p:spPr>
+          <a:xfrm>
+            <a:off x="7097086" y="3944378"/>
+            <a:ext cx="1057013" cy="0"/>
+          </a:xfrm>
+          <a:prstGeom prst="straightConnector1">
+            <a:avLst/>
+          </a:prstGeom>
+          <a:ln>
+            <a:tailEnd type="triangle"/>
+          </a:ln>
+        </p:spPr>
+        <p:style>
+          <a:lnRef idx="1">
+            <a:schemeClr val="dk1"/>
+          </a:lnRef>
+          <a:fillRef idx="0">
+            <a:schemeClr val="dk1"/>
+          </a:fillRef>
+          <a:effectRef idx="0">
+            <a:schemeClr val="dk1"/>
+          </a:effectRef>
+          <a:fontRef idx="minor">
+            <a:schemeClr val="tx1"/>
+          </a:fontRef>
+        </p:style>
+      </p:cxnSp>
+      <p:cxnSp>
+        <p:nvCxnSpPr>
+          <p:cNvPr id="36" name="Conector recto de flecha 35"/>
+          <p:cNvCxnSpPr/>
+          <p:nvPr/>
+        </p:nvCxnSpPr>
+        <p:spPr>
+          <a:xfrm>
+            <a:off x="7097086" y="4271223"/>
+            <a:ext cx="1057013" cy="0"/>
+          </a:xfrm>
+          <a:prstGeom prst="straightConnector1">
+            <a:avLst/>
+          </a:prstGeom>
+          <a:ln>
+            <a:tailEnd type="triangle"/>
+          </a:ln>
+        </p:spPr>
+        <p:style>
+          <a:lnRef idx="1">
+            <a:schemeClr val="dk1"/>
+          </a:lnRef>
+          <a:fillRef idx="0">
+            <a:schemeClr val="dk1"/>
+          </a:fillRef>
+          <a:effectRef idx="0">
+            <a:schemeClr val="dk1"/>
+          </a:effectRef>
+          <a:fontRef idx="minor">
+            <a:schemeClr val="tx1"/>
+          </a:fontRef>
+        </p:style>
+      </p:cxnSp>
+      <p:cxnSp>
+        <p:nvCxnSpPr>
+          <p:cNvPr id="38" name="Conector recto de flecha 37"/>
+          <p:cNvCxnSpPr/>
+          <p:nvPr/>
+        </p:nvCxnSpPr>
+        <p:spPr>
+          <a:xfrm>
+            <a:off x="7097086" y="4607721"/>
+            <a:ext cx="1057013" cy="0"/>
+          </a:xfrm>
+          <a:prstGeom prst="straightConnector1">
+            <a:avLst/>
+          </a:prstGeom>
+          <a:ln>
+            <a:tailEnd type="triangle"/>
+          </a:ln>
+        </p:spPr>
+        <p:style>
+          <a:lnRef idx="1">
+            <a:schemeClr val="dk1"/>
+          </a:lnRef>
+          <a:fillRef idx="0">
+            <a:schemeClr val="dk1"/>
+          </a:fillRef>
+          <a:effectRef idx="0">
+            <a:schemeClr val="dk1"/>
+          </a:effectRef>
+          <a:fontRef idx="minor">
+            <a:schemeClr val="tx1"/>
+          </a:fontRef>
+        </p:style>
+      </p:cxnSp>
+      <p:sp>
+        <p:nvSpPr>
+          <p:cNvPr id="39" name="CuadroTexto 38"/>
+          <p:cNvSpPr txBox="1"/>
+          <p:nvPr/>
+        </p:nvSpPr>
+        <p:spPr>
+          <a:xfrm>
+            <a:off x="8154099" y="3096837"/>
+            <a:ext cx="871136" cy="369332"/>
+          </a:xfrm>
+          <a:prstGeom prst="rect">
+            <a:avLst/>
+          </a:prstGeom>
+          <a:noFill/>
+        </p:spPr>
+        <p:txBody>
+          <a:bodyPr wrap="none" rtlCol="0">
+            <a:spAutoFit/>
+          </a:bodyPr>
+          <a:lstStyle/>
+          <a:p>
+            <a:r>
+              <a:rPr lang="es-419" dirty="0" err="1"/>
+              <a:t>H_Sync</a:t>
+            </a:r>
+            <a:endParaRPr lang="es-419" dirty="0"/>
+          </a:p>
+        </p:txBody>
+      </p:sp>
+      <p:sp>
+        <p:nvSpPr>
+          <p:cNvPr id="41" name="CuadroTexto 40"/>
+          <p:cNvSpPr txBox="1"/>
+          <p:nvPr/>
+        </p:nvSpPr>
+        <p:spPr>
+          <a:xfrm>
+            <a:off x="8154099" y="3442655"/>
+            <a:ext cx="858312" cy="369332"/>
+          </a:xfrm>
+          <a:prstGeom prst="rect">
+            <a:avLst/>
+          </a:prstGeom>
+          <a:noFill/>
+        </p:spPr>
+        <p:txBody>
+          <a:bodyPr wrap="none" rtlCol="0">
+            <a:spAutoFit/>
+          </a:bodyPr>
+          <a:lstStyle/>
+          <a:p>
+            <a:r>
+              <a:rPr lang="es-419" dirty="0" err="1"/>
+              <a:t>V_Sync</a:t>
+            </a:r>
+            <a:endParaRPr lang="es-419" dirty="0"/>
+          </a:p>
+        </p:txBody>
+      </p:sp>
+      <p:sp>
+        <p:nvSpPr>
+          <p:cNvPr id="42" name="CuadroTexto 41"/>
+          <p:cNvSpPr txBox="1"/>
+          <p:nvPr/>
+        </p:nvSpPr>
+        <p:spPr>
+          <a:xfrm>
+            <a:off x="8154099" y="3769764"/>
+            <a:ext cx="309700" cy="369332"/>
+          </a:xfrm>
+          <a:prstGeom prst="rect">
+            <a:avLst/>
+          </a:prstGeom>
+          <a:noFill/>
+        </p:spPr>
+        <p:txBody>
+          <a:bodyPr wrap="none" rtlCol="0">
+            <a:spAutoFit/>
+          </a:bodyPr>
+          <a:lstStyle/>
+          <a:p>
+            <a:r>
+              <a:rPr lang="es-419" dirty="0"/>
+              <a:t>R</a:t>
+            </a:r>
+          </a:p>
+        </p:txBody>
+      </p:sp>
+      <p:sp>
+        <p:nvSpPr>
+          <p:cNvPr id="43" name="CuadroTexto 42"/>
+          <p:cNvSpPr txBox="1"/>
+          <p:nvPr/>
+        </p:nvSpPr>
+        <p:spPr>
+          <a:xfrm>
+            <a:off x="8154099" y="4070435"/>
+            <a:ext cx="330540" cy="369332"/>
+          </a:xfrm>
+          <a:prstGeom prst="rect">
+            <a:avLst/>
+          </a:prstGeom>
+          <a:noFill/>
+        </p:spPr>
+        <p:txBody>
+          <a:bodyPr wrap="none" rtlCol="0">
+            <a:spAutoFit/>
+          </a:bodyPr>
+          <a:lstStyle/>
+          <a:p>
+            <a:r>
+              <a:rPr lang="es-419" dirty="0"/>
+              <a:t>G</a:t>
+            </a:r>
+          </a:p>
+        </p:txBody>
+      </p:sp>
+      <p:sp>
+        <p:nvSpPr>
+          <p:cNvPr id="44" name="CuadroTexto 43"/>
+          <p:cNvSpPr txBox="1"/>
+          <p:nvPr/>
+        </p:nvSpPr>
+        <p:spPr>
+          <a:xfrm>
+            <a:off x="8160457" y="4389155"/>
+            <a:ext cx="309700" cy="369332"/>
+          </a:xfrm>
+          <a:prstGeom prst="rect">
+            <a:avLst/>
+          </a:prstGeom>
+          <a:noFill/>
+        </p:spPr>
+        <p:txBody>
+          <a:bodyPr wrap="none" rtlCol="0">
+            <a:spAutoFit/>
+          </a:bodyPr>
+          <a:lstStyle/>
+          <a:p>
+            <a:r>
+              <a:rPr lang="es-419" dirty="0"/>
+              <a:t>B</a:t>
+            </a:r>
+          </a:p>
+        </p:txBody>
+      </p:sp>
+    </p:spTree>
+    <p:extLst>
+      <p:ext uri="{BB962C8B-B14F-4D97-AF65-F5344CB8AC3E}">
+        <p14:creationId xmlns:p14="http://schemas.microsoft.com/office/powerpoint/2010/main" val="2349656025"/>
+      </p:ext>
+    </p:extLst>
+  </p:cSld>
+  <p:clrMapOvr>
+    <a:masterClrMapping/>
+  </p:clrMapOvr>
+</p:sld>
+</file>
+
+<file path=ppt/slides/slide2.xml><?xml version="1.0" encoding="utf-8"?>
+<p:sld xmlns:a="http://schemas.openxmlformats.org/drawingml/2006/main" xmlns:r="http://schemas.openxmlformats.org/officeDocument/2006/relationships" xmlns:p="http://schemas.openxmlformats.org/presentationml/2006/main">
+  <p:cSld>
+    <p:spTree>
+      <p:nvGrpSpPr>
+        <p:cNvPr id="1" name=""/>
+        <p:cNvGrpSpPr/>
+        <p:nvPr/>
+      </p:nvGrpSpPr>
+      <p:grpSpPr>
+        <a:xfrm>
+          <a:off x="0" y="0"/>
+          <a:ext cx="0" cy="0"/>
+          <a:chOff x="0" y="0"/>
+          <a:chExt cx="0" cy="0"/>
+        </a:xfrm>
+      </p:grpSpPr>
+      <p:sp>
+        <p:nvSpPr>
           <p:cNvPr id="64" name="Rectángulo 63"/>
           <p:cNvSpPr/>
           <p:nvPr/>

</xml_diff>